<commit_message>
utolso kép Fixes #28
</commit_message>
<xml_diff>
--- a/Javító-Projekt.pptx
+++ b/Javító-Projekt.pptx
@@ -15,6 +15,7 @@
     <p:sldId id="263" r:id="rId9"/>
     <p:sldId id="264" r:id="rId10"/>
     <p:sldId id="265" r:id="rId11"/>
+    <p:sldId id="266" r:id="rId12"/>
   </p:sldIdLst>
   <p:sldSz cx="12192000" cy="6858000"/>
   <p:notesSz cx="6858000" cy="9144000"/>
@@ -3830,6 +3831,71 @@
 </p:sld>
 </file>
 
+<file path=ppt/slides/slide11.xml><?xml version="1.0" encoding="utf-8"?>
+<p:sld xmlns:a="http://schemas.openxmlformats.org/drawingml/2006/main" xmlns:r="http://schemas.openxmlformats.org/officeDocument/2006/relationships" xmlns:p="http://schemas.openxmlformats.org/presentationml/2006/main">
+  <p:cSld>
+    <p:spTree>
+      <p:nvGrpSpPr>
+        <p:cNvPr id="1" name=""/>
+        <p:cNvGrpSpPr/>
+        <p:nvPr/>
+      </p:nvGrpSpPr>
+      <p:grpSpPr>
+        <a:xfrm>
+          <a:off x="0" y="0"/>
+          <a:ext cx="0" cy="0"/>
+          <a:chOff x="0" y="0"/>
+          <a:chExt cx="0" cy="0"/>
+        </a:xfrm>
+      </p:grpSpPr>
+      <p:pic>
+        <p:nvPicPr>
+          <p:cNvPr id="5" name="Tartalom helye 4">
+            <a:extLst>
+              <a:ext uri="{FF2B5EF4-FFF2-40B4-BE49-F238E27FC236}">
+                <a16:creationId xmlns:a16="http://schemas.microsoft.com/office/drawing/2014/main" id="{65836FE7-9059-423C-97E6-50E30387A2EA}"/>
+              </a:ext>
+            </a:extLst>
+          </p:cNvPr>
+          <p:cNvPicPr>
+            <a:picLocks noGrp="1" noChangeAspect="1"/>
+          </p:cNvPicPr>
+          <p:nvPr>
+            <p:ph idx="1"/>
+          </p:nvPr>
+        </p:nvPicPr>
+        <p:blipFill>
+          <a:blip r:embed="rId2">
+            <a:extLst>
+              <a:ext uri="{28A0092B-C50C-407E-A947-70E740481C1C}">
+                <a14:useLocalDpi xmlns:a14="http://schemas.microsoft.com/office/drawing/2010/main" val="0"/>
+              </a:ext>
+            </a:extLst>
+          </a:blip>
+          <a:stretch>
+            <a:fillRect/>
+          </a:stretch>
+        </p:blipFill>
+        <p:spPr>
+          <a:xfrm>
+            <a:off x="2802769" y="2012488"/>
+            <a:ext cx="6586462" cy="3944981"/>
+          </a:xfrm>
+        </p:spPr>
+      </p:pic>
+    </p:spTree>
+    <p:extLst>
+      <p:ext uri="{BB962C8B-B14F-4D97-AF65-F5344CB8AC3E}">
+        <p14:creationId xmlns:p14="http://schemas.microsoft.com/office/powerpoint/2010/main" val="2560509866"/>
+      </p:ext>
+    </p:extLst>
+  </p:cSld>
+  <p:clrMapOvr>
+    <a:masterClrMapping/>
+  </p:clrMapOvr>
+</p:sld>
+</file>
+
 <file path=ppt/slides/slide2.xml><?xml version="1.0" encoding="utf-8"?>
 <p:sld xmlns:a="http://schemas.openxmlformats.org/drawingml/2006/main" xmlns:r="http://schemas.openxmlformats.org/officeDocument/2006/relationships" xmlns:p="http://schemas.openxmlformats.org/presentationml/2006/main">
   <p:cSld>

</xml_diff>

<commit_message>
játéknév váltás Fixes #32
</commit_message>
<xml_diff>
--- a/Javító-Projekt.pptx
+++ b/Javító-Projekt.pptx
@@ -7195,18 +7195,19 @@
           <a:lstStyle/>
           <a:p>
             <a:r>
-              <a:rPr lang="hu-HU" dirty="0" err="1">
-                <a:latin typeface="Times New Roman" panose="02020603050405020304" pitchFamily="18" charset="0"/>
-                <a:cs typeface="Times New Roman" panose="02020603050405020304" pitchFamily="18" charset="0"/>
-              </a:rPr>
-              <a:t>Nits</a:t>
+              <a:rPr lang="hu-HU" dirty="0" err="1"/>
+              <a:t>NITSak</a:t>
+            </a:r>
+            <a:r>
+              <a:rPr lang="hu-HU" dirty="0"/>
+              <a:t> egy répa!</a:t>
             </a:r>
             <a:r>
               <a:rPr lang="hu-HU" dirty="0">
                 <a:latin typeface="Times New Roman" panose="02020603050405020304" pitchFamily="18" charset="0"/>
                 <a:cs typeface="Times New Roman" panose="02020603050405020304" pitchFamily="18" charset="0"/>
               </a:rPr>
-              <a:t>-game - képek </a:t>
+              <a:t> - képek </a:t>
             </a:r>
           </a:p>
         </p:txBody>
@@ -7336,18 +7337,19 @@
           <a:lstStyle/>
           <a:p>
             <a:r>
-              <a:rPr lang="hu-HU" dirty="0" err="1">
-                <a:latin typeface="Times New Roman" panose="02020603050405020304" pitchFamily="18" charset="0"/>
-                <a:cs typeface="Times New Roman" panose="02020603050405020304" pitchFamily="18" charset="0"/>
-              </a:rPr>
-              <a:t>Nits</a:t>
+              <a:rPr lang="hu-HU" dirty="0" err="1"/>
+              <a:t>NITSak</a:t>
+            </a:r>
+            <a:r>
+              <a:rPr lang="hu-HU" dirty="0"/>
+              <a:t> egy répa!</a:t>
             </a:r>
             <a:r>
               <a:rPr lang="hu-HU" dirty="0">
                 <a:latin typeface="Times New Roman" panose="02020603050405020304" pitchFamily="18" charset="0"/>
                 <a:cs typeface="Times New Roman" panose="02020603050405020304" pitchFamily="18" charset="0"/>
               </a:rPr>
-              <a:t>-game - mozgás</a:t>
+              <a:t> - mozgás</a:t>
             </a:r>
           </a:p>
         </p:txBody>
@@ -7501,24 +7503,30 @@
             <p:ph type="title"/>
           </p:nvPr>
         </p:nvSpPr>
-        <p:spPr/>
+        <p:spPr>
+          <a:xfrm>
+            <a:off x="646111" y="452718"/>
+            <a:ext cx="9369157" cy="1400530"/>
+          </a:xfrm>
+        </p:spPr>
         <p:txBody>
           <a:bodyPr/>
           <a:lstStyle/>
           <a:p>
             <a:r>
-              <a:rPr lang="hu-HU" dirty="0" err="1">
-                <a:latin typeface="Times New Roman" panose="02020603050405020304" pitchFamily="18" charset="0"/>
-                <a:cs typeface="Times New Roman" panose="02020603050405020304" pitchFamily="18" charset="0"/>
-              </a:rPr>
-              <a:t>Nits</a:t>
+              <a:rPr lang="hu-HU" dirty="0" err="1"/>
+              <a:t>NITSak</a:t>
+            </a:r>
+            <a:r>
+              <a:rPr lang="hu-HU" dirty="0"/>
+              <a:t> egy répa! </a:t>
             </a:r>
             <a:r>
               <a:rPr lang="hu-HU" dirty="0">
                 <a:latin typeface="Times New Roman" panose="02020603050405020304" pitchFamily="18" charset="0"/>
                 <a:cs typeface="Times New Roman" panose="02020603050405020304" pitchFamily="18" charset="0"/>
               </a:rPr>
-              <a:t>-game – játék vége</a:t>
+              <a:t>– játék vége</a:t>
             </a:r>
           </a:p>
         </p:txBody>

</xml_diff>